<commit_message>
update presentation and add calling demo
</commit_message>
<xml_diff>
--- a/presentation.pptx
+++ b/presentation.pptx
@@ -26092,7 +26092,23 @@
                 <a:ea typeface="Tahoma" panose="020B0604030504040204" pitchFamily="34" charset="0"/>
                 <a:cs typeface="Tahoma" panose="020B0604030504040204" pitchFamily="34" charset="0"/>
               </a:rPr>
-              <a:t>Peer(‘your-peers-id'); </a:t>
+              <a:t>Peer</a:t>
+            </a:r>
+            <a:r>
+              <a:rPr lang="en-US" sz="2000" dirty="0">
+                <a:latin typeface="Tahoma" panose="020B0604030504040204" pitchFamily="34" charset="0"/>
+                <a:ea typeface="Tahoma" panose="020B0604030504040204" pitchFamily="34" charset="0"/>
+                <a:cs typeface="Tahoma" panose="020B0604030504040204" pitchFamily="34" charset="0"/>
+              </a:rPr>
+              <a:t>('your-peers-id</a:t>
+            </a:r>
+            <a:r>
+              <a:rPr lang="en-US" sz="2000" dirty="0" smtClean="0">
+                <a:latin typeface="Tahoma" panose="020B0604030504040204" pitchFamily="34" charset="0"/>
+                <a:ea typeface="Tahoma" panose="020B0604030504040204" pitchFamily="34" charset="0"/>
+                <a:cs typeface="Tahoma" panose="020B0604030504040204" pitchFamily="34" charset="0"/>
+              </a:rPr>
+              <a:t>'); </a:t>
             </a:r>
             <a:endParaRPr lang="ru-RU" sz="2000" dirty="0">
               <a:latin typeface="Tahoma" panose="020B0604030504040204" pitchFamily="34" charset="0"/>
@@ -26510,7 +26526,7 @@
         <p:spPr>
           <a:xfrm>
             <a:off x="891540" y="1127760"/>
-            <a:ext cx="7399020" cy="3139321"/>
+            <a:ext cx="7399020" cy="3693319"/>
           </a:xfrm>
           <a:prstGeom prst="rect">
             <a:avLst/>
@@ -26524,12 +26540,20 @@
           <a:p>
             <a:pPr algn="l"/>
             <a:r>
+              <a:rPr lang="en-US" sz="1800" dirty="0" smtClean="0">
+                <a:latin typeface="Tahoma" panose="020B0604030504040204" pitchFamily="34" charset="0"/>
+                <a:ea typeface="Tahoma" panose="020B0604030504040204" pitchFamily="34" charset="0"/>
+                <a:cs typeface="Tahoma" panose="020B0604030504040204" pitchFamily="34" charset="0"/>
+              </a:rPr>
+              <a:t>function(stream) </a:t>
+            </a:r>
+            <a:r>
               <a:rPr lang="en-US" sz="1800" dirty="0">
                 <a:latin typeface="Tahoma" panose="020B0604030504040204" pitchFamily="34" charset="0"/>
                 <a:ea typeface="Tahoma" panose="020B0604030504040204" pitchFamily="34" charset="0"/>
                 <a:cs typeface="Tahoma" panose="020B0604030504040204" pitchFamily="34" charset="0"/>
               </a:rPr>
-              <a:t>function( stream ) {</a:t>
+              <a:t>{</a:t>
             </a:r>
           </a:p>
           <a:p>
@@ -26601,7 +26625,324 @@
                 <a:ea typeface="Tahoma" panose="020B0604030504040204" pitchFamily="34" charset="0"/>
                 <a:cs typeface="Tahoma" panose="020B0604030504040204" pitchFamily="34" charset="0"/>
               </a:rPr>
-              <a:t>( 'another-peers-id', stream );</a:t>
+              <a:t>('another-peers-id', stream);</a:t>
+            </a:r>
+          </a:p>
+          <a:p>
+            <a:pPr algn="l"/>
+            <a:r>
+              <a:rPr lang="en-US" sz="1800" dirty="0" smtClean="0">
+                <a:latin typeface="Tahoma" panose="020B0604030504040204" pitchFamily="34" charset="0"/>
+                <a:ea typeface="Tahoma" panose="020B0604030504040204" pitchFamily="34" charset="0"/>
+                <a:cs typeface="Tahoma" panose="020B0604030504040204" pitchFamily="34" charset="0"/>
+              </a:rPr>
+              <a:t>   function </a:t>
+            </a:r>
+            <a:r>
+              <a:rPr lang="en-US" sz="1800" dirty="0" err="1" smtClean="0">
+                <a:latin typeface="Tahoma" panose="020B0604030504040204" pitchFamily="34" charset="0"/>
+                <a:ea typeface="Tahoma" panose="020B0604030504040204" pitchFamily="34" charset="0"/>
+                <a:cs typeface="Tahoma" panose="020B0604030504040204" pitchFamily="34" charset="0"/>
+              </a:rPr>
+              <a:t>onStream</a:t>
+            </a:r>
+            <a:r>
+              <a:rPr lang="en-US" sz="1800" dirty="0" smtClean="0">
+                <a:latin typeface="Tahoma" panose="020B0604030504040204" pitchFamily="34" charset="0"/>
+                <a:ea typeface="Tahoma" panose="020B0604030504040204" pitchFamily="34" charset="0"/>
+                <a:cs typeface="Tahoma" panose="020B0604030504040204" pitchFamily="34" charset="0"/>
+              </a:rPr>
+              <a:t>(</a:t>
+            </a:r>
+            <a:r>
+              <a:rPr lang="en-US" sz="1800" dirty="0" err="1" smtClean="0">
+                <a:latin typeface="Tahoma" panose="020B0604030504040204" pitchFamily="34" charset="0"/>
+                <a:ea typeface="Tahoma" panose="020B0604030504040204" pitchFamily="34" charset="0"/>
+                <a:cs typeface="Tahoma" panose="020B0604030504040204" pitchFamily="34" charset="0"/>
+              </a:rPr>
+              <a:t>remoteStream</a:t>
+            </a:r>
+            <a:r>
+              <a:rPr lang="en-US" sz="1800" dirty="0" smtClean="0">
+                <a:latin typeface="Tahoma" panose="020B0604030504040204" pitchFamily="34" charset="0"/>
+                <a:ea typeface="Tahoma" panose="020B0604030504040204" pitchFamily="34" charset="0"/>
+                <a:cs typeface="Tahoma" panose="020B0604030504040204" pitchFamily="34" charset="0"/>
+              </a:rPr>
+              <a:t>) </a:t>
+            </a:r>
+            <a:r>
+              <a:rPr lang="en-US" sz="1800" dirty="0">
+                <a:latin typeface="Tahoma" panose="020B0604030504040204" pitchFamily="34" charset="0"/>
+                <a:ea typeface="Tahoma" panose="020B0604030504040204" pitchFamily="34" charset="0"/>
+                <a:cs typeface="Tahoma" panose="020B0604030504040204" pitchFamily="34" charset="0"/>
+              </a:rPr>
+              <a:t>{</a:t>
+            </a:r>
+          </a:p>
+          <a:p>
+            <a:pPr algn="l"/>
+            <a:r>
+              <a:rPr lang="en-US" sz="1800" dirty="0">
+                <a:solidFill>
+                  <a:schemeClr val="bg1">
+                    <a:lumMod val="50000"/>
+                  </a:schemeClr>
+                </a:solidFill>
+                <a:latin typeface="Tahoma" panose="020B0604030504040204" pitchFamily="34" charset="0"/>
+                <a:ea typeface="Tahoma" panose="020B0604030504040204" pitchFamily="34" charset="0"/>
+                <a:cs typeface="Tahoma" panose="020B0604030504040204" pitchFamily="34" charset="0"/>
+              </a:rPr>
+              <a:t>      </a:t>
+            </a:r>
+            <a:r>
+              <a:rPr lang="en-US" sz="1800" dirty="0" err="1">
+                <a:solidFill>
+                  <a:schemeClr val="bg1">
+                    <a:lumMod val="50000"/>
+                  </a:schemeClr>
+                </a:solidFill>
+                <a:latin typeface="Tahoma" panose="020B0604030504040204" pitchFamily="34" charset="0"/>
+                <a:ea typeface="Tahoma" panose="020B0604030504040204" pitchFamily="34" charset="0"/>
+                <a:cs typeface="Tahoma" panose="020B0604030504040204" pitchFamily="34" charset="0"/>
+              </a:rPr>
+              <a:t>var</a:t>
+            </a:r>
+            <a:r>
+              <a:rPr lang="en-US" sz="1800" dirty="0">
+                <a:solidFill>
+                  <a:schemeClr val="bg1">
+                    <a:lumMod val="50000"/>
+                  </a:schemeClr>
+                </a:solidFill>
+                <a:latin typeface="Tahoma" panose="020B0604030504040204" pitchFamily="34" charset="0"/>
+                <a:ea typeface="Tahoma" panose="020B0604030504040204" pitchFamily="34" charset="0"/>
+                <a:cs typeface="Tahoma" panose="020B0604030504040204" pitchFamily="34" charset="0"/>
+              </a:rPr>
+              <a:t> </a:t>
+            </a:r>
+            <a:r>
+              <a:rPr lang="en-US" sz="1800" dirty="0" err="1">
+                <a:solidFill>
+                  <a:schemeClr val="bg1">
+                    <a:lumMod val="50000"/>
+                  </a:schemeClr>
+                </a:solidFill>
+                <a:latin typeface="Tahoma" panose="020B0604030504040204" pitchFamily="34" charset="0"/>
+                <a:ea typeface="Tahoma" panose="020B0604030504040204" pitchFamily="34" charset="0"/>
+                <a:cs typeface="Tahoma" panose="020B0604030504040204" pitchFamily="34" charset="0"/>
+              </a:rPr>
+              <a:t>videoElement</a:t>
+            </a:r>
+            <a:r>
+              <a:rPr lang="en-US" sz="1800" dirty="0">
+                <a:solidFill>
+                  <a:schemeClr val="bg1">
+                    <a:lumMod val="50000"/>
+                  </a:schemeClr>
+                </a:solidFill>
+                <a:latin typeface="Tahoma" panose="020B0604030504040204" pitchFamily="34" charset="0"/>
+                <a:ea typeface="Tahoma" panose="020B0604030504040204" pitchFamily="34" charset="0"/>
+                <a:cs typeface="Tahoma" panose="020B0604030504040204" pitchFamily="34" charset="0"/>
+              </a:rPr>
+              <a:t> = </a:t>
+            </a:r>
+            <a:r>
+              <a:rPr lang="en-US" sz="1800" dirty="0" err="1" smtClean="0">
+                <a:solidFill>
+                  <a:schemeClr val="bg1">
+                    <a:lumMod val="50000"/>
+                  </a:schemeClr>
+                </a:solidFill>
+                <a:latin typeface="Tahoma" panose="020B0604030504040204" pitchFamily="34" charset="0"/>
+                <a:ea typeface="Tahoma" panose="020B0604030504040204" pitchFamily="34" charset="0"/>
+                <a:cs typeface="Tahoma" panose="020B0604030504040204" pitchFamily="34" charset="0"/>
+              </a:rPr>
+              <a:t>document.getElementById</a:t>
+            </a:r>
+            <a:r>
+              <a:rPr lang="en-US" sz="1800" dirty="0">
+                <a:solidFill>
+                  <a:schemeClr val="bg1">
+                    <a:lumMod val="50000"/>
+                  </a:schemeClr>
+                </a:solidFill>
+                <a:latin typeface="Tahoma" panose="020B0604030504040204" pitchFamily="34" charset="0"/>
+                <a:ea typeface="Tahoma" panose="020B0604030504040204" pitchFamily="34" charset="0"/>
+                <a:cs typeface="Tahoma" panose="020B0604030504040204" pitchFamily="34" charset="0"/>
+              </a:rPr>
+              <a:t>(</a:t>
+            </a:r>
+            <a:r>
+              <a:rPr lang="en-US" sz="1800" dirty="0" smtClean="0">
+                <a:solidFill>
+                  <a:schemeClr val="bg1">
+                    <a:lumMod val="50000"/>
+                  </a:schemeClr>
+                </a:solidFill>
+                <a:latin typeface="Tahoma" panose="020B0604030504040204" pitchFamily="34" charset="0"/>
+                <a:ea typeface="Tahoma" panose="020B0604030504040204" pitchFamily="34" charset="0"/>
+                <a:cs typeface="Tahoma" panose="020B0604030504040204" pitchFamily="34" charset="0"/>
+              </a:rPr>
+              <a:t>'</a:t>
+            </a:r>
+            <a:r>
+              <a:rPr lang="en-US" sz="1800" dirty="0" err="1" smtClean="0">
+                <a:solidFill>
+                  <a:schemeClr val="bg1">
+                    <a:lumMod val="50000"/>
+                  </a:schemeClr>
+                </a:solidFill>
+                <a:latin typeface="Tahoma" panose="020B0604030504040204" pitchFamily="34" charset="0"/>
+                <a:ea typeface="Tahoma" panose="020B0604030504040204" pitchFamily="34" charset="0"/>
+                <a:cs typeface="Tahoma" panose="020B0604030504040204" pitchFamily="34" charset="0"/>
+              </a:rPr>
+              <a:t>incomeVideo</a:t>
+            </a:r>
+            <a:r>
+              <a:rPr lang="en-US" sz="1800" dirty="0" smtClean="0">
+                <a:solidFill>
+                  <a:schemeClr val="bg1">
+                    <a:lumMod val="50000"/>
+                  </a:schemeClr>
+                </a:solidFill>
+                <a:latin typeface="Tahoma" panose="020B0604030504040204" pitchFamily="34" charset="0"/>
+                <a:ea typeface="Tahoma" panose="020B0604030504040204" pitchFamily="34" charset="0"/>
+                <a:cs typeface="Tahoma" panose="020B0604030504040204" pitchFamily="34" charset="0"/>
+              </a:rPr>
+              <a:t>');</a:t>
+            </a:r>
+            <a:endParaRPr lang="en-US" sz="1800" dirty="0">
+              <a:solidFill>
+                <a:schemeClr val="bg1">
+                  <a:lumMod val="50000"/>
+                </a:schemeClr>
+              </a:solidFill>
+              <a:latin typeface="Tahoma" panose="020B0604030504040204" pitchFamily="34" charset="0"/>
+              <a:ea typeface="Tahoma" panose="020B0604030504040204" pitchFamily="34" charset="0"/>
+              <a:cs typeface="Tahoma" panose="020B0604030504040204" pitchFamily="34" charset="0"/>
+            </a:endParaRPr>
+          </a:p>
+          <a:p>
+            <a:pPr algn="l"/>
+            <a:r>
+              <a:rPr lang="en-US" sz="1800" dirty="0">
+                <a:solidFill>
+                  <a:schemeClr val="bg1">
+                    <a:lumMod val="50000"/>
+                  </a:schemeClr>
+                </a:solidFill>
+                <a:latin typeface="Tahoma" panose="020B0604030504040204" pitchFamily="34" charset="0"/>
+                <a:ea typeface="Tahoma" panose="020B0604030504040204" pitchFamily="34" charset="0"/>
+                <a:cs typeface="Tahoma" panose="020B0604030504040204" pitchFamily="34" charset="0"/>
+              </a:rPr>
+              <a:t>      </a:t>
+            </a:r>
+            <a:r>
+              <a:rPr lang="en-US" sz="1800" dirty="0" err="1">
+                <a:solidFill>
+                  <a:schemeClr val="bg1">
+                    <a:lumMod val="50000"/>
+                  </a:schemeClr>
+                </a:solidFill>
+                <a:latin typeface="Tahoma" panose="020B0604030504040204" pitchFamily="34" charset="0"/>
+                <a:ea typeface="Tahoma" panose="020B0604030504040204" pitchFamily="34" charset="0"/>
+                <a:cs typeface="Tahoma" panose="020B0604030504040204" pitchFamily="34" charset="0"/>
+              </a:rPr>
+              <a:t>videoElement.src</a:t>
+            </a:r>
+            <a:r>
+              <a:rPr lang="en-US" sz="1800" dirty="0">
+                <a:solidFill>
+                  <a:schemeClr val="bg1">
+                    <a:lumMod val="50000"/>
+                  </a:schemeClr>
+                </a:solidFill>
+                <a:latin typeface="Tahoma" panose="020B0604030504040204" pitchFamily="34" charset="0"/>
+                <a:ea typeface="Tahoma" panose="020B0604030504040204" pitchFamily="34" charset="0"/>
+                <a:cs typeface="Tahoma" panose="020B0604030504040204" pitchFamily="34" charset="0"/>
+              </a:rPr>
+              <a:t> = </a:t>
+            </a:r>
+            <a:r>
+              <a:rPr lang="en-US" sz="1800" dirty="0" err="1" smtClean="0">
+                <a:solidFill>
+                  <a:schemeClr val="bg1">
+                    <a:lumMod val="50000"/>
+                  </a:schemeClr>
+                </a:solidFill>
+                <a:latin typeface="Tahoma" panose="020B0604030504040204" pitchFamily="34" charset="0"/>
+                <a:ea typeface="Tahoma" panose="020B0604030504040204" pitchFamily="34" charset="0"/>
+                <a:cs typeface="Tahoma" panose="020B0604030504040204" pitchFamily="34" charset="0"/>
+              </a:rPr>
+              <a:t>URL.createObjectURL</a:t>
+            </a:r>
+            <a:r>
+              <a:rPr lang="en-US" sz="1800" dirty="0" smtClean="0">
+                <a:solidFill>
+                  <a:schemeClr val="bg1">
+                    <a:lumMod val="50000"/>
+                  </a:schemeClr>
+                </a:solidFill>
+                <a:latin typeface="Tahoma" panose="020B0604030504040204" pitchFamily="34" charset="0"/>
+                <a:ea typeface="Tahoma" panose="020B0604030504040204" pitchFamily="34" charset="0"/>
+                <a:cs typeface="Tahoma" panose="020B0604030504040204" pitchFamily="34" charset="0"/>
+              </a:rPr>
+              <a:t>(</a:t>
+            </a:r>
+            <a:r>
+              <a:rPr lang="en-US" sz="1800" dirty="0" err="1" smtClean="0">
+                <a:solidFill>
+                  <a:schemeClr val="bg1">
+                    <a:lumMod val="50000"/>
+                  </a:schemeClr>
+                </a:solidFill>
+                <a:latin typeface="Tahoma" panose="020B0604030504040204" pitchFamily="34" charset="0"/>
+                <a:ea typeface="Tahoma" panose="020B0604030504040204" pitchFamily="34" charset="0"/>
+                <a:cs typeface="Tahoma" panose="020B0604030504040204" pitchFamily="34" charset="0"/>
+              </a:rPr>
+              <a:t>remoteStream</a:t>
+            </a:r>
+            <a:r>
+              <a:rPr lang="en-US" sz="1800" dirty="0" smtClean="0">
+                <a:solidFill>
+                  <a:schemeClr val="bg1">
+                    <a:lumMod val="50000"/>
+                  </a:schemeClr>
+                </a:solidFill>
+                <a:latin typeface="Tahoma" panose="020B0604030504040204" pitchFamily="34" charset="0"/>
+                <a:ea typeface="Tahoma" panose="020B0604030504040204" pitchFamily="34" charset="0"/>
+                <a:cs typeface="Tahoma" panose="020B0604030504040204" pitchFamily="34" charset="0"/>
+              </a:rPr>
+              <a:t>);</a:t>
+            </a:r>
+            <a:endParaRPr lang="en-US" sz="1800" dirty="0">
+              <a:solidFill>
+                <a:schemeClr val="bg1">
+                  <a:lumMod val="50000"/>
+                </a:schemeClr>
+              </a:solidFill>
+              <a:latin typeface="Tahoma" panose="020B0604030504040204" pitchFamily="34" charset="0"/>
+              <a:ea typeface="Tahoma" panose="020B0604030504040204" pitchFamily="34" charset="0"/>
+              <a:cs typeface="Tahoma" panose="020B0604030504040204" pitchFamily="34" charset="0"/>
+            </a:endParaRPr>
+          </a:p>
+          <a:p>
+            <a:pPr algn="l"/>
+            <a:r>
+              <a:rPr lang="en-US" sz="1800" dirty="0">
+                <a:latin typeface="Tahoma" panose="020B0604030504040204" pitchFamily="34" charset="0"/>
+                <a:ea typeface="Tahoma" panose="020B0604030504040204" pitchFamily="34" charset="0"/>
+                <a:cs typeface="Tahoma" panose="020B0604030504040204" pitchFamily="34" charset="0"/>
+              </a:rPr>
+              <a:t>   </a:t>
+            </a:r>
+            <a:r>
+              <a:rPr lang="en-US" sz="1800" dirty="0" smtClean="0">
+                <a:latin typeface="Tahoma" panose="020B0604030504040204" pitchFamily="34" charset="0"/>
+                <a:ea typeface="Tahoma" panose="020B0604030504040204" pitchFamily="34" charset="0"/>
+                <a:cs typeface="Tahoma" panose="020B0604030504040204" pitchFamily="34" charset="0"/>
+              </a:rPr>
+              <a:t>}</a:t>
             </a:r>
           </a:p>
           <a:p>
@@ -26615,6 +26956,156 @@
               <a:t>   </a:t>
             </a:r>
             <a:r>
+              <a:rPr lang="en-US" sz="1800" dirty="0" err="1" smtClean="0">
+                <a:latin typeface="Tahoma" panose="020B0604030504040204" pitchFamily="34" charset="0"/>
+                <a:ea typeface="Tahoma" panose="020B0604030504040204" pitchFamily="34" charset="0"/>
+                <a:cs typeface="Tahoma" panose="020B0604030504040204" pitchFamily="34" charset="0"/>
+              </a:rPr>
+              <a:t>call.on</a:t>
+            </a:r>
+            <a:r>
+              <a:rPr lang="en-US" sz="1800" dirty="0">
+                <a:latin typeface="Tahoma" panose="020B0604030504040204" pitchFamily="34" charset="0"/>
+                <a:ea typeface="Tahoma" panose="020B0604030504040204" pitchFamily="34" charset="0"/>
+                <a:cs typeface="Tahoma" panose="020B0604030504040204" pitchFamily="34" charset="0"/>
+              </a:rPr>
+              <a:t>('stream</a:t>
+            </a:r>
+            <a:r>
+              <a:rPr lang="en-US" sz="1800" dirty="0" smtClean="0">
+                <a:latin typeface="Tahoma" panose="020B0604030504040204" pitchFamily="34" charset="0"/>
+                <a:ea typeface="Tahoma" panose="020B0604030504040204" pitchFamily="34" charset="0"/>
+                <a:cs typeface="Tahoma" panose="020B0604030504040204" pitchFamily="34" charset="0"/>
+              </a:rPr>
+              <a:t>', </a:t>
+            </a:r>
+            <a:r>
+              <a:rPr lang="en-US" sz="1800" dirty="0" err="1" smtClean="0">
+                <a:latin typeface="Tahoma" panose="020B0604030504040204" pitchFamily="34" charset="0"/>
+                <a:ea typeface="Tahoma" panose="020B0604030504040204" pitchFamily="34" charset="0"/>
+                <a:cs typeface="Tahoma" panose="020B0604030504040204" pitchFamily="34" charset="0"/>
+              </a:rPr>
+              <a:t>onStream</a:t>
+            </a:r>
+            <a:r>
+              <a:rPr lang="en-US" sz="1800" dirty="0" smtClean="0">
+                <a:latin typeface="Tahoma" panose="020B0604030504040204" pitchFamily="34" charset="0"/>
+                <a:ea typeface="Tahoma" panose="020B0604030504040204" pitchFamily="34" charset="0"/>
+                <a:cs typeface="Tahoma" panose="020B0604030504040204" pitchFamily="34" charset="0"/>
+              </a:rPr>
+              <a:t>);</a:t>
+            </a:r>
+            <a:endParaRPr lang="ru-RU" sz="1800" dirty="0" smtClean="0">
+              <a:latin typeface="Tahoma" panose="020B0604030504040204" pitchFamily="34" charset="0"/>
+              <a:ea typeface="Tahoma" panose="020B0604030504040204" pitchFamily="34" charset="0"/>
+              <a:cs typeface="Tahoma" panose="020B0604030504040204" pitchFamily="34" charset="0"/>
+            </a:endParaRPr>
+          </a:p>
+          <a:p>
+            <a:pPr algn="l"/>
+            <a:r>
+              <a:rPr lang="ru-RU" sz="1800" dirty="0">
+                <a:latin typeface="Tahoma" panose="020B0604030504040204" pitchFamily="34" charset="0"/>
+                <a:ea typeface="Tahoma" panose="020B0604030504040204" pitchFamily="34" charset="0"/>
+                <a:cs typeface="Tahoma" panose="020B0604030504040204" pitchFamily="34" charset="0"/>
+              </a:rPr>
+              <a:t> </a:t>
+            </a:r>
+            <a:r>
+              <a:rPr lang="ru-RU" sz="1800" dirty="0" smtClean="0">
+                <a:latin typeface="Tahoma" panose="020B0604030504040204" pitchFamily="34" charset="0"/>
+                <a:ea typeface="Tahoma" panose="020B0604030504040204" pitchFamily="34" charset="0"/>
+                <a:cs typeface="Tahoma" panose="020B0604030504040204" pitchFamily="34" charset="0"/>
+              </a:rPr>
+              <a:t>  </a:t>
+            </a:r>
+            <a:r>
+              <a:rPr lang="en-US" sz="1800" b="1" dirty="0" err="1" smtClean="0">
+                <a:latin typeface="Tahoma" panose="020B0604030504040204" pitchFamily="34" charset="0"/>
+                <a:ea typeface="Tahoma" panose="020B0604030504040204" pitchFamily="34" charset="0"/>
+                <a:cs typeface="Tahoma" panose="020B0604030504040204" pitchFamily="34" charset="0"/>
+              </a:rPr>
+              <a:t>peer.on</a:t>
+            </a:r>
+            <a:r>
+              <a:rPr lang="en-US" sz="1800" b="1" dirty="0" smtClean="0">
+                <a:latin typeface="Tahoma" panose="020B0604030504040204" pitchFamily="34" charset="0"/>
+                <a:ea typeface="Tahoma" panose="020B0604030504040204" pitchFamily="34" charset="0"/>
+                <a:cs typeface="Tahoma" panose="020B0604030504040204" pitchFamily="34" charset="0"/>
+              </a:rPr>
+              <a:t>('call</a:t>
+            </a:r>
+            <a:r>
+              <a:rPr lang="en-US" sz="1800" b="1" dirty="0">
+                <a:latin typeface="Tahoma" panose="020B0604030504040204" pitchFamily="34" charset="0"/>
+                <a:ea typeface="Tahoma" panose="020B0604030504040204" pitchFamily="34" charset="0"/>
+                <a:cs typeface="Tahoma" panose="020B0604030504040204" pitchFamily="34" charset="0"/>
+              </a:rPr>
+              <a:t>', </a:t>
+            </a:r>
+            <a:r>
+              <a:rPr lang="en-US" sz="1800" dirty="0" smtClean="0">
+                <a:latin typeface="Tahoma" panose="020B0604030504040204" pitchFamily="34" charset="0"/>
+                <a:ea typeface="Tahoma" panose="020B0604030504040204" pitchFamily="34" charset="0"/>
+                <a:cs typeface="Tahoma" panose="020B0604030504040204" pitchFamily="34" charset="0"/>
+              </a:rPr>
+              <a:t>function(call) </a:t>
+            </a:r>
+            <a:r>
+              <a:rPr lang="en-US" sz="1800" dirty="0">
+                <a:latin typeface="Tahoma" panose="020B0604030504040204" pitchFamily="34" charset="0"/>
+                <a:ea typeface="Tahoma" panose="020B0604030504040204" pitchFamily="34" charset="0"/>
+                <a:cs typeface="Tahoma" panose="020B0604030504040204" pitchFamily="34" charset="0"/>
+              </a:rPr>
+              <a:t>{</a:t>
+            </a:r>
+          </a:p>
+          <a:p>
+            <a:pPr algn="l"/>
+            <a:r>
+              <a:rPr lang="en-US" sz="1800" dirty="0">
+                <a:latin typeface="Tahoma" panose="020B0604030504040204" pitchFamily="34" charset="0"/>
+                <a:ea typeface="Tahoma" panose="020B0604030504040204" pitchFamily="34" charset="0"/>
+                <a:cs typeface="Tahoma" panose="020B0604030504040204" pitchFamily="34" charset="0"/>
+              </a:rPr>
+              <a:t>      </a:t>
+            </a:r>
+            <a:r>
+              <a:rPr lang="en-US" sz="1800" dirty="0" err="1" smtClean="0">
+                <a:latin typeface="Tahoma" panose="020B0604030504040204" pitchFamily="34" charset="0"/>
+                <a:ea typeface="Tahoma" panose="020B0604030504040204" pitchFamily="34" charset="0"/>
+                <a:cs typeface="Tahoma" panose="020B0604030504040204" pitchFamily="34" charset="0"/>
+              </a:rPr>
+              <a:t>call.answer</a:t>
+            </a:r>
+            <a:r>
+              <a:rPr lang="en-US" sz="1800" dirty="0" smtClean="0">
+                <a:latin typeface="Tahoma" panose="020B0604030504040204" pitchFamily="34" charset="0"/>
+                <a:ea typeface="Tahoma" panose="020B0604030504040204" pitchFamily="34" charset="0"/>
+                <a:cs typeface="Tahoma" panose="020B0604030504040204" pitchFamily="34" charset="0"/>
+              </a:rPr>
+              <a:t>(stream);</a:t>
+            </a:r>
+          </a:p>
+          <a:p>
+            <a:pPr algn="l"/>
+            <a:r>
+              <a:rPr lang="en-US" sz="1800" dirty="0">
+                <a:latin typeface="Tahoma" panose="020B0604030504040204" pitchFamily="34" charset="0"/>
+                <a:ea typeface="Tahoma" panose="020B0604030504040204" pitchFamily="34" charset="0"/>
+                <a:cs typeface="Tahoma" panose="020B0604030504040204" pitchFamily="34" charset="0"/>
+              </a:rPr>
+              <a:t> </a:t>
+            </a:r>
+            <a:r>
+              <a:rPr lang="en-US" sz="1800" dirty="0" smtClean="0">
+                <a:latin typeface="Tahoma" panose="020B0604030504040204" pitchFamily="34" charset="0"/>
+                <a:ea typeface="Tahoma" panose="020B0604030504040204" pitchFamily="34" charset="0"/>
+                <a:cs typeface="Tahoma" panose="020B0604030504040204" pitchFamily="34" charset="0"/>
+              </a:rPr>
+              <a:t>     </a:t>
+            </a:r>
+            <a:r>
               <a:rPr lang="en-US" sz="1800" dirty="0" err="1">
                 <a:latin typeface="Tahoma" panose="020B0604030504040204" pitchFamily="34" charset="0"/>
                 <a:ea typeface="Tahoma" panose="020B0604030504040204" pitchFamily="34" charset="0"/>
@@ -26628,7 +27119,7 @@
                 <a:ea typeface="Tahoma" panose="020B0604030504040204" pitchFamily="34" charset="0"/>
                 <a:cs typeface="Tahoma" panose="020B0604030504040204" pitchFamily="34" charset="0"/>
               </a:rPr>
-              <a:t>( 'stream', function( </a:t>
+              <a:t>('stream', </a:t>
             </a:r>
             <a:r>
               <a:rPr lang="en-US" sz="1800" dirty="0" err="1">
@@ -26636,7 +27127,7 @@
                 <a:ea typeface="Tahoma" panose="020B0604030504040204" pitchFamily="34" charset="0"/>
                 <a:cs typeface="Tahoma" panose="020B0604030504040204" pitchFamily="34" charset="0"/>
               </a:rPr>
-              <a:t>remoteStream</a:t>
+              <a:t>onStream</a:t>
             </a:r>
             <a:r>
               <a:rPr lang="en-US" sz="1800" dirty="0">
@@ -26644,352 +27135,31 @@
                 <a:ea typeface="Tahoma" panose="020B0604030504040204" pitchFamily="34" charset="0"/>
                 <a:cs typeface="Tahoma" panose="020B0604030504040204" pitchFamily="34" charset="0"/>
               </a:rPr>
-              <a:t> ) {</a:t>
-            </a:r>
+              <a:t>);</a:t>
+            </a:r>
+            <a:endParaRPr lang="ru-RU" sz="1800" dirty="0">
+              <a:latin typeface="Tahoma" panose="020B0604030504040204" pitchFamily="34" charset="0"/>
+              <a:ea typeface="Tahoma" panose="020B0604030504040204" pitchFamily="34" charset="0"/>
+              <a:cs typeface="Tahoma" panose="020B0604030504040204" pitchFamily="34" charset="0"/>
+            </a:endParaRPr>
           </a:p>
           <a:p>
             <a:pPr algn="l"/>
             <a:r>
-              <a:rPr lang="en-US" sz="1800" dirty="0">
-                <a:solidFill>
-                  <a:schemeClr val="bg1">
-                    <a:lumMod val="50000"/>
-                  </a:schemeClr>
-                </a:solidFill>
+              <a:rPr lang="en-US" sz="1800" dirty="0" smtClean="0">
                 <a:latin typeface="Tahoma" panose="020B0604030504040204" pitchFamily="34" charset="0"/>
                 <a:ea typeface="Tahoma" panose="020B0604030504040204" pitchFamily="34" charset="0"/>
                 <a:cs typeface="Tahoma" panose="020B0604030504040204" pitchFamily="34" charset="0"/>
               </a:rPr>
-              <a:t>      </a:t>
-            </a:r>
-            <a:r>
-              <a:rPr lang="en-US" sz="1800" dirty="0" err="1">
-                <a:solidFill>
-                  <a:schemeClr val="bg1">
-                    <a:lumMod val="50000"/>
-                  </a:schemeClr>
-                </a:solidFill>
-                <a:latin typeface="Tahoma" panose="020B0604030504040204" pitchFamily="34" charset="0"/>
-                <a:ea typeface="Tahoma" panose="020B0604030504040204" pitchFamily="34" charset="0"/>
-                <a:cs typeface="Tahoma" panose="020B0604030504040204" pitchFamily="34" charset="0"/>
-              </a:rPr>
-              <a:t>var</a:t>
-            </a:r>
-            <a:r>
-              <a:rPr lang="en-US" sz="1800" dirty="0">
-                <a:solidFill>
-                  <a:schemeClr val="bg1">
-                    <a:lumMod val="50000"/>
-                  </a:schemeClr>
-                </a:solidFill>
-                <a:latin typeface="Tahoma" panose="020B0604030504040204" pitchFamily="34" charset="0"/>
-                <a:ea typeface="Tahoma" panose="020B0604030504040204" pitchFamily="34" charset="0"/>
-                <a:cs typeface="Tahoma" panose="020B0604030504040204" pitchFamily="34" charset="0"/>
-              </a:rPr>
-              <a:t> </a:t>
-            </a:r>
-            <a:r>
-              <a:rPr lang="en-US" sz="1800" dirty="0" err="1">
-                <a:solidFill>
-                  <a:schemeClr val="bg1">
-                    <a:lumMod val="50000"/>
-                  </a:schemeClr>
-                </a:solidFill>
-                <a:latin typeface="Tahoma" panose="020B0604030504040204" pitchFamily="34" charset="0"/>
-                <a:ea typeface="Tahoma" panose="020B0604030504040204" pitchFamily="34" charset="0"/>
-                <a:cs typeface="Tahoma" panose="020B0604030504040204" pitchFamily="34" charset="0"/>
-              </a:rPr>
-              <a:t>videoElement</a:t>
-            </a:r>
-            <a:r>
-              <a:rPr lang="en-US" sz="1800" dirty="0">
-                <a:solidFill>
-                  <a:schemeClr val="bg1">
-                    <a:lumMod val="50000"/>
-                  </a:schemeClr>
-                </a:solidFill>
-                <a:latin typeface="Tahoma" panose="020B0604030504040204" pitchFamily="34" charset="0"/>
-                <a:ea typeface="Tahoma" panose="020B0604030504040204" pitchFamily="34" charset="0"/>
-                <a:cs typeface="Tahoma" panose="020B0604030504040204" pitchFamily="34" charset="0"/>
-              </a:rPr>
-              <a:t> = </a:t>
-            </a:r>
-            <a:r>
-              <a:rPr lang="en-US" sz="1800" dirty="0" err="1">
-                <a:solidFill>
-                  <a:schemeClr val="bg1">
-                    <a:lumMod val="50000"/>
-                  </a:schemeClr>
-                </a:solidFill>
-                <a:latin typeface="Tahoma" panose="020B0604030504040204" pitchFamily="34" charset="0"/>
-                <a:ea typeface="Tahoma" panose="020B0604030504040204" pitchFamily="34" charset="0"/>
-                <a:cs typeface="Tahoma" panose="020B0604030504040204" pitchFamily="34" charset="0"/>
-              </a:rPr>
-              <a:t>document.getElementById</a:t>
-            </a:r>
-            <a:r>
-              <a:rPr lang="en-US" sz="1800" dirty="0">
-                <a:solidFill>
-                  <a:schemeClr val="bg1">
-                    <a:lumMod val="50000"/>
-                  </a:schemeClr>
-                </a:solidFill>
-                <a:latin typeface="Tahoma" panose="020B0604030504040204" pitchFamily="34" charset="0"/>
-                <a:ea typeface="Tahoma" panose="020B0604030504040204" pitchFamily="34" charset="0"/>
-                <a:cs typeface="Tahoma" panose="020B0604030504040204" pitchFamily="34" charset="0"/>
-              </a:rPr>
-              <a:t>( </a:t>
-            </a:r>
-            <a:r>
-              <a:rPr lang="en-US" sz="1800" dirty="0" smtClean="0">
-                <a:solidFill>
-                  <a:schemeClr val="bg1">
-                    <a:lumMod val="50000"/>
-                  </a:schemeClr>
-                </a:solidFill>
-                <a:latin typeface="Tahoma" panose="020B0604030504040204" pitchFamily="34" charset="0"/>
-                <a:ea typeface="Tahoma" panose="020B0604030504040204" pitchFamily="34" charset="0"/>
-                <a:cs typeface="Tahoma" panose="020B0604030504040204" pitchFamily="34" charset="0"/>
-              </a:rPr>
-              <a:t>‘</a:t>
-            </a:r>
-            <a:r>
-              <a:rPr lang="en-US" sz="1800" dirty="0" err="1" smtClean="0">
-                <a:solidFill>
-                  <a:schemeClr val="bg1">
-                    <a:lumMod val="50000"/>
-                  </a:schemeClr>
-                </a:solidFill>
-                <a:latin typeface="Tahoma" panose="020B0604030504040204" pitchFamily="34" charset="0"/>
-                <a:ea typeface="Tahoma" panose="020B0604030504040204" pitchFamily="34" charset="0"/>
-                <a:cs typeface="Tahoma" panose="020B0604030504040204" pitchFamily="34" charset="0"/>
-              </a:rPr>
-              <a:t>incomeVideo</a:t>
-            </a:r>
-            <a:r>
-              <a:rPr lang="en-US" sz="1800" dirty="0">
-                <a:solidFill>
-                  <a:schemeClr val="bg1">
-                    <a:lumMod val="50000"/>
-                  </a:schemeClr>
-                </a:solidFill>
-                <a:latin typeface="Tahoma" panose="020B0604030504040204" pitchFamily="34" charset="0"/>
-                <a:ea typeface="Tahoma" panose="020B0604030504040204" pitchFamily="34" charset="0"/>
-                <a:cs typeface="Tahoma" panose="020B0604030504040204" pitchFamily="34" charset="0"/>
-              </a:rPr>
-              <a:t>' );</a:t>
-            </a:r>
-          </a:p>
-          <a:p>
-            <a:pPr algn="l"/>
-            <a:r>
-              <a:rPr lang="en-US" sz="1800" dirty="0">
-                <a:solidFill>
-                  <a:schemeClr val="bg1">
-                    <a:lumMod val="50000"/>
-                  </a:schemeClr>
-                </a:solidFill>
-                <a:latin typeface="Tahoma" panose="020B0604030504040204" pitchFamily="34" charset="0"/>
-                <a:ea typeface="Tahoma" panose="020B0604030504040204" pitchFamily="34" charset="0"/>
-                <a:cs typeface="Tahoma" panose="020B0604030504040204" pitchFamily="34" charset="0"/>
-              </a:rPr>
-              <a:t>      </a:t>
-            </a:r>
-            <a:r>
-              <a:rPr lang="en-US" sz="1800" dirty="0" err="1">
-                <a:solidFill>
-                  <a:schemeClr val="bg1">
-                    <a:lumMod val="50000"/>
-                  </a:schemeClr>
-                </a:solidFill>
-                <a:latin typeface="Tahoma" panose="020B0604030504040204" pitchFamily="34" charset="0"/>
-                <a:ea typeface="Tahoma" panose="020B0604030504040204" pitchFamily="34" charset="0"/>
-                <a:cs typeface="Tahoma" panose="020B0604030504040204" pitchFamily="34" charset="0"/>
-              </a:rPr>
-              <a:t>videoElement.src</a:t>
-            </a:r>
-            <a:r>
-              <a:rPr lang="en-US" sz="1800" dirty="0">
-                <a:solidFill>
-                  <a:schemeClr val="bg1">
-                    <a:lumMod val="50000"/>
-                  </a:schemeClr>
-                </a:solidFill>
-                <a:latin typeface="Tahoma" panose="020B0604030504040204" pitchFamily="34" charset="0"/>
-                <a:ea typeface="Tahoma" panose="020B0604030504040204" pitchFamily="34" charset="0"/>
-                <a:cs typeface="Tahoma" panose="020B0604030504040204" pitchFamily="34" charset="0"/>
-              </a:rPr>
-              <a:t> = </a:t>
-            </a:r>
-            <a:r>
-              <a:rPr lang="en-US" sz="1800" dirty="0" err="1">
-                <a:solidFill>
-                  <a:schemeClr val="bg1">
-                    <a:lumMod val="50000"/>
-                  </a:schemeClr>
-                </a:solidFill>
-                <a:latin typeface="Tahoma" panose="020B0604030504040204" pitchFamily="34" charset="0"/>
-                <a:ea typeface="Tahoma" panose="020B0604030504040204" pitchFamily="34" charset="0"/>
-                <a:cs typeface="Tahoma" panose="020B0604030504040204" pitchFamily="34" charset="0"/>
-              </a:rPr>
-              <a:t>URL.createObjectURL</a:t>
-            </a:r>
-            <a:r>
-              <a:rPr lang="en-US" sz="1800" dirty="0" smtClean="0">
-                <a:solidFill>
-                  <a:schemeClr val="bg1">
-                    <a:lumMod val="50000"/>
-                  </a:schemeClr>
-                </a:solidFill>
-                <a:latin typeface="Tahoma" panose="020B0604030504040204" pitchFamily="34" charset="0"/>
-                <a:ea typeface="Tahoma" panose="020B0604030504040204" pitchFamily="34" charset="0"/>
-                <a:cs typeface="Tahoma" panose="020B0604030504040204" pitchFamily="34" charset="0"/>
-              </a:rPr>
-              <a:t>( </a:t>
-            </a:r>
-            <a:r>
-              <a:rPr lang="en-US" sz="1800" dirty="0" err="1" smtClean="0">
-                <a:solidFill>
-                  <a:schemeClr val="bg1">
-                    <a:lumMod val="50000"/>
-                  </a:schemeClr>
-                </a:solidFill>
-                <a:latin typeface="Tahoma" panose="020B0604030504040204" pitchFamily="34" charset="0"/>
-                <a:ea typeface="Tahoma" panose="020B0604030504040204" pitchFamily="34" charset="0"/>
-                <a:cs typeface="Tahoma" panose="020B0604030504040204" pitchFamily="34" charset="0"/>
-              </a:rPr>
-              <a:t>remoteStream</a:t>
-            </a:r>
-            <a:r>
-              <a:rPr lang="en-US" sz="1800" dirty="0" smtClean="0">
-                <a:solidFill>
-                  <a:schemeClr val="bg1">
-                    <a:lumMod val="50000"/>
-                  </a:schemeClr>
-                </a:solidFill>
-                <a:latin typeface="Tahoma" panose="020B0604030504040204" pitchFamily="34" charset="0"/>
-                <a:ea typeface="Tahoma" panose="020B0604030504040204" pitchFamily="34" charset="0"/>
-                <a:cs typeface="Tahoma" panose="020B0604030504040204" pitchFamily="34" charset="0"/>
-              </a:rPr>
-              <a:t> </a:t>
-            </a:r>
-            <a:r>
-              <a:rPr lang="en-US" sz="1800" dirty="0">
-                <a:solidFill>
-                  <a:schemeClr val="bg1">
-                    <a:lumMod val="50000"/>
-                  </a:schemeClr>
-                </a:solidFill>
-                <a:latin typeface="Tahoma" panose="020B0604030504040204" pitchFamily="34" charset="0"/>
-                <a:ea typeface="Tahoma" panose="020B0604030504040204" pitchFamily="34" charset="0"/>
-                <a:cs typeface="Tahoma" panose="020B0604030504040204" pitchFamily="34" charset="0"/>
-              </a:rPr>
-              <a:t>);</a:t>
-            </a:r>
-          </a:p>
-          <a:p>
-            <a:pPr algn="l"/>
+              <a:t>   </a:t>
+            </a:r>
             <a:r>
               <a:rPr lang="en-US" sz="1800" dirty="0">
                 <a:latin typeface="Tahoma" panose="020B0604030504040204" pitchFamily="34" charset="0"/>
                 <a:ea typeface="Tahoma" panose="020B0604030504040204" pitchFamily="34" charset="0"/>
                 <a:cs typeface="Tahoma" panose="020B0604030504040204" pitchFamily="34" charset="0"/>
               </a:rPr>
-              <a:t>   </a:t>
-            </a:r>
-            <a:r>
-              <a:rPr lang="en-US" sz="1800" dirty="0" smtClean="0">
-                <a:latin typeface="Tahoma" panose="020B0604030504040204" pitchFamily="34" charset="0"/>
-                <a:ea typeface="Tahoma" panose="020B0604030504040204" pitchFamily="34" charset="0"/>
-                <a:cs typeface="Tahoma" panose="020B0604030504040204" pitchFamily="34" charset="0"/>
-              </a:rPr>
               <a:t>});</a:t>
-            </a:r>
-            <a:endParaRPr lang="ru-RU" sz="1800" dirty="0" smtClean="0">
-              <a:latin typeface="Tahoma" panose="020B0604030504040204" pitchFamily="34" charset="0"/>
-              <a:ea typeface="Tahoma" panose="020B0604030504040204" pitchFamily="34" charset="0"/>
-              <a:cs typeface="Tahoma" panose="020B0604030504040204" pitchFamily="34" charset="0"/>
-            </a:endParaRPr>
-          </a:p>
-          <a:p>
-            <a:pPr algn="l"/>
-            <a:r>
-              <a:rPr lang="ru-RU" sz="1800" dirty="0">
-                <a:latin typeface="Tahoma" panose="020B0604030504040204" pitchFamily="34" charset="0"/>
-                <a:ea typeface="Tahoma" panose="020B0604030504040204" pitchFamily="34" charset="0"/>
-                <a:cs typeface="Tahoma" panose="020B0604030504040204" pitchFamily="34" charset="0"/>
-              </a:rPr>
-              <a:t> </a:t>
-            </a:r>
-            <a:r>
-              <a:rPr lang="ru-RU" sz="1800" dirty="0" smtClean="0">
-                <a:latin typeface="Tahoma" panose="020B0604030504040204" pitchFamily="34" charset="0"/>
-                <a:ea typeface="Tahoma" panose="020B0604030504040204" pitchFamily="34" charset="0"/>
-                <a:cs typeface="Tahoma" panose="020B0604030504040204" pitchFamily="34" charset="0"/>
-              </a:rPr>
-              <a:t>  </a:t>
-            </a:r>
-            <a:r>
-              <a:rPr lang="en-US" sz="1800" b="1" dirty="0" err="1" smtClean="0">
-                <a:latin typeface="Tahoma" panose="020B0604030504040204" pitchFamily="34" charset="0"/>
-                <a:ea typeface="Tahoma" panose="020B0604030504040204" pitchFamily="34" charset="0"/>
-                <a:cs typeface="Tahoma" panose="020B0604030504040204" pitchFamily="34" charset="0"/>
-              </a:rPr>
-              <a:t>peer.on</a:t>
-            </a:r>
-            <a:r>
-              <a:rPr lang="en-US" sz="1800" b="1" dirty="0">
-                <a:latin typeface="Tahoma" panose="020B0604030504040204" pitchFamily="34" charset="0"/>
-                <a:ea typeface="Tahoma" panose="020B0604030504040204" pitchFamily="34" charset="0"/>
-                <a:cs typeface="Tahoma" panose="020B0604030504040204" pitchFamily="34" charset="0"/>
-              </a:rPr>
-              <a:t>( 'call', </a:t>
-            </a:r>
-            <a:r>
-              <a:rPr lang="en-US" sz="1800" dirty="0">
-                <a:latin typeface="Tahoma" panose="020B0604030504040204" pitchFamily="34" charset="0"/>
-                <a:ea typeface="Tahoma" panose="020B0604030504040204" pitchFamily="34" charset="0"/>
-                <a:cs typeface="Tahoma" panose="020B0604030504040204" pitchFamily="34" charset="0"/>
-              </a:rPr>
-              <a:t>function( call ) {</a:t>
-            </a:r>
-          </a:p>
-          <a:p>
-            <a:pPr algn="l"/>
-            <a:r>
-              <a:rPr lang="en-US" sz="1800" dirty="0">
-                <a:latin typeface="Tahoma" panose="020B0604030504040204" pitchFamily="34" charset="0"/>
-                <a:ea typeface="Tahoma" panose="020B0604030504040204" pitchFamily="34" charset="0"/>
-                <a:cs typeface="Tahoma" panose="020B0604030504040204" pitchFamily="34" charset="0"/>
-              </a:rPr>
-              <a:t>      </a:t>
-            </a:r>
-            <a:r>
-              <a:rPr lang="en-US" sz="1800" dirty="0" err="1">
-                <a:latin typeface="Tahoma" panose="020B0604030504040204" pitchFamily="34" charset="0"/>
-                <a:ea typeface="Tahoma" panose="020B0604030504040204" pitchFamily="34" charset="0"/>
-                <a:cs typeface="Tahoma" panose="020B0604030504040204" pitchFamily="34" charset="0"/>
-              </a:rPr>
-              <a:t>call.answer</a:t>
-            </a:r>
-            <a:r>
-              <a:rPr lang="en-US" sz="1800" dirty="0">
-                <a:latin typeface="Tahoma" panose="020B0604030504040204" pitchFamily="34" charset="0"/>
-                <a:ea typeface="Tahoma" panose="020B0604030504040204" pitchFamily="34" charset="0"/>
-                <a:cs typeface="Tahoma" panose="020B0604030504040204" pitchFamily="34" charset="0"/>
-              </a:rPr>
-              <a:t>( stream );</a:t>
-            </a:r>
-          </a:p>
-          <a:p>
-            <a:pPr algn="l"/>
-            <a:r>
-              <a:rPr lang="en-US" sz="1800" dirty="0">
-                <a:latin typeface="Tahoma" panose="020B0604030504040204" pitchFamily="34" charset="0"/>
-                <a:ea typeface="Tahoma" panose="020B0604030504040204" pitchFamily="34" charset="0"/>
-                <a:cs typeface="Tahoma" panose="020B0604030504040204" pitchFamily="34" charset="0"/>
-              </a:rPr>
-              <a:t>   });</a:t>
             </a:r>
           </a:p>
           <a:p>
@@ -31679,7 +31849,7 @@
                 <a:ea typeface="Tahoma" panose="020B0604030504040204" pitchFamily="34" charset="0"/>
                 <a:cs typeface="Tahoma" panose="020B0604030504040204" pitchFamily="34" charset="0"/>
               </a:rPr>
-              <a:t>function( stream </a:t>
+              <a:t>function(stream) </a:t>
             </a:r>
             <a:r>
               <a:rPr lang="en-US" sz="2300" dirty="0">
@@ -31687,7 +31857,7 @@
                 <a:ea typeface="Tahoma" panose="020B0604030504040204" pitchFamily="34" charset="0"/>
                 <a:cs typeface="Tahoma" panose="020B0604030504040204" pitchFamily="34" charset="0"/>
               </a:rPr>
-              <a:t>) {</a:t>
+              <a:t>{</a:t>
             </a:r>
           </a:p>
           <a:p>
@@ -31741,13 +31911,18 @@
               <a:t>document.getElementById</a:t>
             </a:r>
             <a:r>
-              <a:rPr lang="en-US" sz="2300" dirty="0">
+              <a:rPr lang="en-US" sz="2300" dirty="0" smtClean="0">
                 <a:latin typeface="Tahoma" panose="020B0604030504040204" pitchFamily="34" charset="0"/>
                 <a:ea typeface="Tahoma" panose="020B0604030504040204" pitchFamily="34" charset="0"/>
                 <a:cs typeface="Tahoma" panose="020B0604030504040204" pitchFamily="34" charset="0"/>
               </a:rPr>
-              <a:t>( 'video' );</a:t>
-            </a:r>
+              <a:t>('video');</a:t>
+            </a:r>
+            <a:endParaRPr lang="en-US" sz="2300" dirty="0">
+              <a:latin typeface="Tahoma" panose="020B0604030504040204" pitchFamily="34" charset="0"/>
+              <a:ea typeface="Tahoma" panose="020B0604030504040204" pitchFamily="34" charset="0"/>
+              <a:cs typeface="Tahoma" panose="020B0604030504040204" pitchFamily="34" charset="0"/>
+            </a:endParaRPr>
           </a:p>
           <a:p>
             <a:pPr algn="l"/>
@@ -31776,7 +31951,7 @@
               <a:t> = </a:t>
             </a:r>
             <a:r>
-              <a:rPr lang="en-US" sz="2300" dirty="0" err="1">
+              <a:rPr lang="en-US" sz="2300" dirty="0" err="1" smtClean="0">
                 <a:latin typeface="Tahoma" panose="020B0604030504040204" pitchFamily="34" charset="0"/>
                 <a:ea typeface="Tahoma" panose="020B0604030504040204" pitchFamily="34" charset="0"/>
                 <a:cs typeface="Tahoma" panose="020B0604030504040204" pitchFamily="34" charset="0"/>
@@ -31784,13 +31959,18 @@
               <a:t>URL.createObjectURL</a:t>
             </a:r>
             <a:r>
-              <a:rPr lang="en-US" sz="2300" dirty="0">
+              <a:rPr lang="en-US" sz="2300" dirty="0" smtClean="0">
                 <a:latin typeface="Tahoma" panose="020B0604030504040204" pitchFamily="34" charset="0"/>
                 <a:ea typeface="Tahoma" panose="020B0604030504040204" pitchFamily="34" charset="0"/>
                 <a:cs typeface="Tahoma" panose="020B0604030504040204" pitchFamily="34" charset="0"/>
               </a:rPr>
-              <a:t>( stream );</a:t>
-            </a:r>
+              <a:t>(stream);</a:t>
+            </a:r>
+            <a:endParaRPr lang="en-US" sz="2300" dirty="0">
+              <a:latin typeface="Tahoma" panose="020B0604030504040204" pitchFamily="34" charset="0"/>
+              <a:ea typeface="Tahoma" panose="020B0604030504040204" pitchFamily="34" charset="0"/>
+              <a:cs typeface="Tahoma" panose="020B0604030504040204" pitchFamily="34" charset="0"/>
+            </a:endParaRPr>
           </a:p>
           <a:p>
             <a:pPr algn="l"/>
@@ -32307,7 +32487,7 @@
                 <a:ea typeface="Tahoma" panose="020B0604030504040204" pitchFamily="34" charset="0"/>
                 <a:cs typeface="Tahoma" panose="020B0604030504040204" pitchFamily="34" charset="0"/>
               </a:rPr>
-              <a:t>https://maqentaer.com/js-webrtc/demo.html</a:t>
+              <a:t>https://maqentaer.github.io/js-webrtc/demo.html</a:t>
             </a:r>
             <a:endParaRPr lang="en-US" sz="2300" dirty="0" smtClean="0">
               <a:latin typeface="Tahoma" panose="020B0604030504040204" pitchFamily="34" charset="0"/>

</xml_diff>

<commit_message>
upda sizes and presentation
</commit_message>
<xml_diff>
--- a/presentation.pptx
+++ b/presentation.pptx
@@ -27695,8 +27695,8 @@
         </p:nvSpPr>
         <p:spPr>
           <a:xfrm>
-            <a:off x="792480" y="890588"/>
-            <a:ext cx="7345680" cy="538609"/>
+            <a:off x="792480" y="1431608"/>
+            <a:ext cx="7345680" cy="461665"/>
           </a:xfrm>
           <a:prstGeom prst="rect">
             <a:avLst/>
@@ -27710,14 +27710,30 @@
           <a:p>
             <a:pPr algn="l"/>
             <a:r>
-              <a:rPr lang="en-US" sz="2800" dirty="0" smtClean="0">
+              <a:rPr lang="en-US" sz="2400" dirty="0" smtClean="0">
                 <a:latin typeface="Tahoma" panose="020B0604030504040204" pitchFamily="34" charset="0"/>
                 <a:ea typeface="Tahoma" panose="020B0604030504040204" pitchFamily="34" charset="0"/>
                 <a:cs typeface="Tahoma" panose="020B0604030504040204" pitchFamily="34" charset="0"/>
               </a:rPr>
-              <a:t>https://maqentaer.com/js-webrtc/caller.html</a:t>
-            </a:r>
-            <a:endParaRPr lang="ru-RU" sz="2800" dirty="0">
+              <a:t>https://</a:t>
+            </a:r>
+            <a:r>
+              <a:rPr lang="en-US" sz="2400" dirty="0">
+                <a:latin typeface="Tahoma" panose="020B0604030504040204" pitchFamily="34" charset="0"/>
+                <a:ea typeface="Tahoma" panose="020B0604030504040204" pitchFamily="34" charset="0"/>
+                <a:cs typeface="Tahoma" panose="020B0604030504040204" pitchFamily="34" charset="0"/>
+              </a:rPr>
+              <a:t>maqentaer.github.io</a:t>
+            </a:r>
+            <a:r>
+              <a:rPr lang="en-US" sz="2400" dirty="0" smtClean="0">
+                <a:latin typeface="Tahoma" panose="020B0604030504040204" pitchFamily="34" charset="0"/>
+                <a:ea typeface="Tahoma" panose="020B0604030504040204" pitchFamily="34" charset="0"/>
+                <a:cs typeface="Tahoma" panose="020B0604030504040204" pitchFamily="34" charset="0"/>
+              </a:rPr>
+              <a:t>/js-webrtc/caller.html</a:t>
+            </a:r>
+            <a:endParaRPr lang="ru-RU" sz="2400" dirty="0">
               <a:latin typeface="Tahoma" panose="020B0604030504040204" pitchFamily="34" charset="0"/>
               <a:ea typeface="Tahoma" panose="020B0604030504040204" pitchFamily="34" charset="0"/>
               <a:cs typeface="Tahoma" panose="020B0604030504040204" pitchFamily="34" charset="0"/>
@@ -27733,8 +27749,8 @@
         </p:nvSpPr>
         <p:spPr>
           <a:xfrm>
-            <a:off x="792480" y="1568768"/>
-            <a:ext cx="7703820" cy="523220"/>
+            <a:off x="792480" y="814388"/>
+            <a:ext cx="7703820" cy="461665"/>
           </a:xfrm>
           <a:prstGeom prst="rect">
             <a:avLst/>
@@ -27748,14 +27764,38 @@
           <a:p>
             <a:pPr algn="l"/>
             <a:r>
-              <a:rPr lang="en-US" sz="2800" dirty="0">
+              <a:rPr lang="en-US" sz="2400" dirty="0">
                 <a:latin typeface="Tahoma" panose="020B0604030504040204" pitchFamily="34" charset="0"/>
                 <a:ea typeface="Tahoma" panose="020B0604030504040204" pitchFamily="34" charset="0"/>
                 <a:cs typeface="Tahoma" panose="020B0604030504040204" pitchFamily="34" charset="0"/>
               </a:rPr>
-              <a:t>https://maqentaer.com/js-webrtc/receiver.html</a:t>
-            </a:r>
-            <a:endParaRPr lang="ru-RU" sz="2800" dirty="0">
+              <a:t>https</a:t>
+            </a:r>
+            <a:r>
+              <a:rPr lang="en-US" sz="2400" dirty="0" smtClean="0">
+                <a:latin typeface="Tahoma" panose="020B0604030504040204" pitchFamily="34" charset="0"/>
+                <a:ea typeface="Tahoma" panose="020B0604030504040204" pitchFamily="34" charset="0"/>
+                <a:cs typeface="Tahoma" panose="020B0604030504040204" pitchFamily="34" charset="0"/>
+              </a:rPr>
+              <a:t>://</a:t>
+            </a:r>
+            <a:r>
+              <a:rPr lang="en-US" sz="2400" dirty="0">
+                <a:latin typeface="Tahoma" panose="020B0604030504040204" pitchFamily="34" charset="0"/>
+                <a:ea typeface="Tahoma" panose="020B0604030504040204" pitchFamily="34" charset="0"/>
+                <a:cs typeface="Tahoma" panose="020B0604030504040204" pitchFamily="34" charset="0"/>
+              </a:rPr>
+              <a:t>maqentaer.github.io</a:t>
+            </a:r>
+            <a:r>
+              <a:rPr lang="en-US" sz="2400" dirty="0" smtClean="0">
+                <a:latin typeface="Tahoma" panose="020B0604030504040204" pitchFamily="34" charset="0"/>
+                <a:ea typeface="Tahoma" panose="020B0604030504040204" pitchFamily="34" charset="0"/>
+                <a:cs typeface="Tahoma" panose="020B0604030504040204" pitchFamily="34" charset="0"/>
+              </a:rPr>
+              <a:t>/js-webrtc/receiver.html</a:t>
+            </a:r>
+            <a:endParaRPr lang="ru-RU" sz="2400" dirty="0">
               <a:latin typeface="Tahoma" panose="020B0604030504040204" pitchFamily="34" charset="0"/>
               <a:ea typeface="Tahoma" panose="020B0604030504040204" pitchFamily="34" charset="0"/>
               <a:cs typeface="Tahoma" panose="020B0604030504040204" pitchFamily="34" charset="0"/>
@@ -27765,7 +27805,7 @@
       </p:sp>
       <p:pic>
         <p:nvPicPr>
-          <p:cNvPr id="4098" name="Picture 2" descr="Preview of your QR Code"/>
+          <p:cNvPr id="4104" name="Picture 8" descr="Preview of your QR Code"/>
           <p:cNvPicPr>
             <a:picLocks noChangeAspect="1" noChangeArrowheads="1"/>
           </p:cNvPicPr>
@@ -27786,7 +27826,7 @@
         </p:blipFill>
         <p:spPr bwMode="auto">
           <a:xfrm>
-            <a:off x="5425440" y="2466232"/>
+            <a:off x="5466715" y="2355532"/>
             <a:ext cx="2095500" cy="2095501"/>
           </a:xfrm>
           <a:prstGeom prst="rect">
@@ -27806,7 +27846,7 @@
       </p:pic>
       <p:pic>
         <p:nvPicPr>
-          <p:cNvPr id="4100" name="Picture 4" descr="Preview of your QR Code"/>
+          <p:cNvPr id="4106" name="Picture 10" descr="Preview of your QR Code"/>
           <p:cNvPicPr>
             <a:picLocks noChangeAspect="1" noChangeArrowheads="1"/>
           </p:cNvPicPr>
@@ -27827,7 +27867,7 @@
         </p:blipFill>
         <p:spPr bwMode="auto">
           <a:xfrm>
-            <a:off x="1367155" y="2466233"/>
+            <a:off x="1374775" y="2355532"/>
             <a:ext cx="2095500" cy="2095501"/>
           </a:xfrm>
           <a:prstGeom prst="rect">
@@ -32499,7 +32539,7 @@
       </p:sp>
       <p:pic>
         <p:nvPicPr>
-          <p:cNvPr id="3074" name="Picture 2" descr="Preview of your QR Code"/>
+          <p:cNvPr id="3076" name="Picture 4" descr="Preview of your QR Code"/>
           <p:cNvPicPr>
             <a:picLocks noChangeAspect="1" noChangeArrowheads="1"/>
           </p:cNvPicPr>
@@ -32520,7 +32560,7 @@
         </p:blipFill>
         <p:spPr bwMode="auto">
           <a:xfrm>
-            <a:off x="3409315" y="2126932"/>
+            <a:off x="3524251" y="2035492"/>
             <a:ext cx="2095500" cy="2095501"/>
           </a:xfrm>
           <a:prstGeom prst="rect">

</xml_diff>

<commit_message>
changed to srcObject set
</commit_message>
<xml_diff>
--- a/presentation.pptx
+++ b/presentation.pptx
@@ -26838,7 +26838,7 @@
               <a:t>      </a:t>
             </a:r>
             <a:r>
-              <a:rPr lang="en-US" sz="1800" dirty="0" err="1">
+              <a:rPr lang="en-US" sz="1800" dirty="0" err="1" smtClean="0">
                 <a:solidFill>
                   <a:schemeClr val="bg1">
                     <a:lumMod val="50000"/>
@@ -26848,10 +26848,10 @@
                 <a:ea typeface="Tahoma" panose="020B0604030504040204" pitchFamily="34" charset="0"/>
                 <a:cs typeface="Tahoma" panose="020B0604030504040204" pitchFamily="34" charset="0"/>
               </a:rPr>
-              <a:t>videoElement.src</a:t>
-            </a:r>
-            <a:r>
-              <a:rPr lang="en-US" sz="1800" dirty="0">
+              <a:t>videoElement</a:t>
+            </a:r>
+            <a:r>
+              <a:rPr lang="en-US" sz="1800" dirty="0" err="1" smtClean="0">
                 <a:solidFill>
                   <a:schemeClr val="bg1">
                     <a:lumMod val="50000"/>
@@ -26861,10 +26861,10 @@
                 <a:ea typeface="Tahoma" panose="020B0604030504040204" pitchFamily="34" charset="0"/>
                 <a:cs typeface="Tahoma" panose="020B0604030504040204" pitchFamily="34" charset="0"/>
               </a:rPr>
-              <a:t> = </a:t>
-            </a:r>
-            <a:r>
-              <a:rPr lang="en-US" sz="1800" dirty="0" err="1" smtClean="0">
+              <a:t>.srcObject</a:t>
+            </a:r>
+            <a:r>
+              <a:rPr lang="en-US" sz="1800" dirty="0" smtClean="0">
                 <a:solidFill>
                   <a:schemeClr val="bg1">
                     <a:lumMod val="50000"/>
@@ -26874,7 +26874,7 @@
                 <a:ea typeface="Tahoma" panose="020B0604030504040204" pitchFamily="34" charset="0"/>
                 <a:cs typeface="Tahoma" panose="020B0604030504040204" pitchFamily="34" charset="0"/>
               </a:rPr>
-              <a:t>URL.createObjectURL</a:t>
+              <a:t> </a:t>
             </a:r>
             <a:r>
               <a:rPr lang="en-US" sz="1800" dirty="0" smtClean="0">
@@ -26887,7 +26887,7 @@
                 <a:ea typeface="Tahoma" panose="020B0604030504040204" pitchFamily="34" charset="0"/>
                 <a:cs typeface="Tahoma" panose="020B0604030504040204" pitchFamily="34" charset="0"/>
               </a:rPr>
-              <a:t>(</a:t>
+              <a:t>= </a:t>
             </a:r>
             <a:r>
               <a:rPr lang="en-US" sz="1800" dirty="0" err="1" smtClean="0">
@@ -26913,7 +26913,7 @@
                 <a:ea typeface="Tahoma" panose="020B0604030504040204" pitchFamily="34" charset="0"/>
                 <a:cs typeface="Tahoma" panose="020B0604030504040204" pitchFamily="34" charset="0"/>
               </a:rPr>
-              <a:t>);</a:t>
+              <a:t>;</a:t>
             </a:r>
             <a:endParaRPr lang="en-US" sz="1800" dirty="0">
               <a:solidFill>
@@ -31975,28 +31975,12 @@
               <a:t>   </a:t>
             </a:r>
             <a:r>
-              <a:rPr lang="en-US" sz="2300" dirty="0" err="1">
-                <a:latin typeface="Tahoma" panose="020B0604030504040204" pitchFamily="34" charset="0"/>
-                <a:ea typeface="Tahoma" panose="020B0604030504040204" pitchFamily="34" charset="0"/>
-                <a:cs typeface="Tahoma" panose="020B0604030504040204" pitchFamily="34" charset="0"/>
-              </a:rPr>
-              <a:t>videoElement.src</a:t>
-            </a:r>
-            <a:r>
-              <a:rPr lang="en-US" sz="2300" dirty="0">
-                <a:latin typeface="Tahoma" panose="020B0604030504040204" pitchFamily="34" charset="0"/>
-                <a:ea typeface="Tahoma" panose="020B0604030504040204" pitchFamily="34" charset="0"/>
-                <a:cs typeface="Tahoma" panose="020B0604030504040204" pitchFamily="34" charset="0"/>
-              </a:rPr>
-              <a:t> = </a:t>
-            </a:r>
-            <a:r>
               <a:rPr lang="en-US" sz="2300" dirty="0" err="1" smtClean="0">
                 <a:latin typeface="Tahoma" panose="020B0604030504040204" pitchFamily="34" charset="0"/>
                 <a:ea typeface="Tahoma" panose="020B0604030504040204" pitchFamily="34" charset="0"/>
                 <a:cs typeface="Tahoma" panose="020B0604030504040204" pitchFamily="34" charset="0"/>
               </a:rPr>
-              <a:t>URL.createObjectURL</a:t>
+              <a:t>videoElement.srcObject</a:t>
             </a:r>
             <a:r>
               <a:rPr lang="en-US" sz="2300" dirty="0" smtClean="0">
@@ -32004,7 +31988,23 @@
                 <a:ea typeface="Tahoma" panose="020B0604030504040204" pitchFamily="34" charset="0"/>
                 <a:cs typeface="Tahoma" panose="020B0604030504040204" pitchFamily="34" charset="0"/>
               </a:rPr>
-              <a:t>(stream);</a:t>
+              <a:t> </a:t>
+            </a:r>
+            <a:r>
+              <a:rPr lang="en-US" sz="2300">
+                <a:latin typeface="Tahoma" panose="020B0604030504040204" pitchFamily="34" charset="0"/>
+                <a:ea typeface="Tahoma" panose="020B0604030504040204" pitchFamily="34" charset="0"/>
+                <a:cs typeface="Tahoma" panose="020B0604030504040204" pitchFamily="34" charset="0"/>
+              </a:rPr>
+              <a:t>= </a:t>
+            </a:r>
+            <a:r>
+              <a:rPr lang="en-US" sz="2300" smtClean="0">
+                <a:latin typeface="Tahoma" panose="020B0604030504040204" pitchFamily="34" charset="0"/>
+                <a:ea typeface="Tahoma" panose="020B0604030504040204" pitchFamily="34" charset="0"/>
+                <a:cs typeface="Tahoma" panose="020B0604030504040204" pitchFamily="34" charset="0"/>
+              </a:rPr>
+              <a:t>stream;</a:t>
             </a:r>
             <a:endParaRPr lang="en-US" sz="2300" dirty="0">
               <a:latin typeface="Tahoma" panose="020B0604030504040204" pitchFamily="34" charset="0"/>

</xml_diff>